<commit_message>
se agrego interfaces a mapas de Navegacion
</commit_message>
<xml_diff>
--- a/Documentacion/MapaDeNavegacion.pptx
+++ b/Documentacion/MapaDeNavegacion.pptx
@@ -6,6 +6,10 @@
   </p:sldMasterIdLst>
   <p:sldIdLst>
     <p:sldId id="256" r:id="rId2"/>
+    <p:sldId id="257" r:id="rId3"/>
+    <p:sldId id="258" r:id="rId4"/>
+    <p:sldId id="259" r:id="rId5"/>
+    <p:sldId id="261" r:id="rId6"/>
   </p:sldIdLst>
   <p:sldSz cx="12192000" cy="6858000"/>
   <p:notesSz cx="6858000" cy="9144000"/>
@@ -104,6 +108,11 @@
       </a:defRPr>
     </a:lvl9pPr>
   </p:defaultTextStyle>
+  <p:extLst>
+    <p:ext uri="{EFAFB233-063F-42B5-8137-9DF3F51BA10A}">
+      <p15:sldGuideLst xmlns:p15="http://schemas.microsoft.com/office/powerpoint/2012/main"/>
+    </p:ext>
+  </p:extLst>
 </p:presentation>
 </file>
 
@@ -238,7 +247,7 @@
           <a:p>
             <a:fld id="{6C0DDE51-EE13-4411-8EE6-8EC10941598C}" type="datetimeFigureOut">
               <a:rPr lang="es-GT" smtClean="0"/>
-              <a:t>30/03/2016</a:t>
+              <a:t>3/04/2016</a:t>
             </a:fld>
             <a:endParaRPr lang="es-GT"/>
           </a:p>
@@ -408,7 +417,7 @@
           <a:p>
             <a:fld id="{6C0DDE51-EE13-4411-8EE6-8EC10941598C}" type="datetimeFigureOut">
               <a:rPr lang="es-GT" smtClean="0"/>
-              <a:t>30/03/2016</a:t>
+              <a:t>3/04/2016</a:t>
             </a:fld>
             <a:endParaRPr lang="es-GT"/>
           </a:p>
@@ -588,7 +597,7 @@
           <a:p>
             <a:fld id="{6C0DDE51-EE13-4411-8EE6-8EC10941598C}" type="datetimeFigureOut">
               <a:rPr lang="es-GT" smtClean="0"/>
-              <a:t>30/03/2016</a:t>
+              <a:t>3/04/2016</a:t>
             </a:fld>
             <a:endParaRPr lang="es-GT"/>
           </a:p>
@@ -758,7 +767,7 @@
           <a:p>
             <a:fld id="{6C0DDE51-EE13-4411-8EE6-8EC10941598C}" type="datetimeFigureOut">
               <a:rPr lang="es-GT" smtClean="0"/>
-              <a:t>30/03/2016</a:t>
+              <a:t>3/04/2016</a:t>
             </a:fld>
             <a:endParaRPr lang="es-GT"/>
           </a:p>
@@ -1004,7 +1013,7 @@
           <a:p>
             <a:fld id="{6C0DDE51-EE13-4411-8EE6-8EC10941598C}" type="datetimeFigureOut">
               <a:rPr lang="es-GT" smtClean="0"/>
-              <a:t>30/03/2016</a:t>
+              <a:t>3/04/2016</a:t>
             </a:fld>
             <a:endParaRPr lang="es-GT"/>
           </a:p>
@@ -1236,7 +1245,7 @@
           <a:p>
             <a:fld id="{6C0DDE51-EE13-4411-8EE6-8EC10941598C}" type="datetimeFigureOut">
               <a:rPr lang="es-GT" smtClean="0"/>
-              <a:t>30/03/2016</a:t>
+              <a:t>3/04/2016</a:t>
             </a:fld>
             <a:endParaRPr lang="es-GT"/>
           </a:p>
@@ -1603,7 +1612,7 @@
           <a:p>
             <a:fld id="{6C0DDE51-EE13-4411-8EE6-8EC10941598C}" type="datetimeFigureOut">
               <a:rPr lang="es-GT" smtClean="0"/>
-              <a:t>30/03/2016</a:t>
+              <a:t>3/04/2016</a:t>
             </a:fld>
             <a:endParaRPr lang="es-GT"/>
           </a:p>
@@ -1721,7 +1730,7 @@
           <a:p>
             <a:fld id="{6C0DDE51-EE13-4411-8EE6-8EC10941598C}" type="datetimeFigureOut">
               <a:rPr lang="es-GT" smtClean="0"/>
-              <a:t>30/03/2016</a:t>
+              <a:t>3/04/2016</a:t>
             </a:fld>
             <a:endParaRPr lang="es-GT"/>
           </a:p>
@@ -1816,7 +1825,7 @@
           <a:p>
             <a:fld id="{6C0DDE51-EE13-4411-8EE6-8EC10941598C}" type="datetimeFigureOut">
               <a:rPr lang="es-GT" smtClean="0"/>
-              <a:t>30/03/2016</a:t>
+              <a:t>3/04/2016</a:t>
             </a:fld>
             <a:endParaRPr lang="es-GT"/>
           </a:p>
@@ -2093,7 +2102,7 @@
           <a:p>
             <a:fld id="{6C0DDE51-EE13-4411-8EE6-8EC10941598C}" type="datetimeFigureOut">
               <a:rPr lang="es-GT" smtClean="0"/>
-              <a:t>30/03/2016</a:t>
+              <a:t>3/04/2016</a:t>
             </a:fld>
             <a:endParaRPr lang="es-GT"/>
           </a:p>
@@ -2346,7 +2355,7 @@
           <a:p>
             <a:fld id="{6C0DDE51-EE13-4411-8EE6-8EC10941598C}" type="datetimeFigureOut">
               <a:rPr lang="es-GT" smtClean="0"/>
-              <a:t>30/03/2016</a:t>
+              <a:t>3/04/2016</a:t>
             </a:fld>
             <a:endParaRPr lang="es-GT"/>
           </a:p>
@@ -2559,7 +2568,7 @@
           <a:p>
             <a:fld id="{6C0DDE51-EE13-4411-8EE6-8EC10941598C}" type="datetimeFigureOut">
               <a:rPr lang="es-GT" smtClean="0"/>
-              <a:t>30/03/2016</a:t>
+              <a:t>3/04/2016</a:t>
             </a:fld>
             <a:endParaRPr lang="es-GT"/>
           </a:p>
@@ -4207,6 +4216,2148 @@
 </p:sld>
 </file>
 
+<file path=ppt/slides/slide2.xml><?xml version="1.0" encoding="utf-8"?>
+<p:sld xmlns:a="http://schemas.openxmlformats.org/drawingml/2006/main" xmlns:r="http://schemas.openxmlformats.org/officeDocument/2006/relationships" xmlns:p="http://schemas.openxmlformats.org/presentationml/2006/main">
+  <p:cSld>
+    <p:spTree>
+      <p:nvGrpSpPr>
+        <p:cNvPr id="1" name=""/>
+        <p:cNvGrpSpPr/>
+        <p:nvPr/>
+      </p:nvGrpSpPr>
+      <p:grpSpPr>
+        <a:xfrm>
+          <a:off x="0" y="0"/>
+          <a:ext cx="0" cy="0"/>
+          <a:chOff x="0" y="0"/>
+          <a:chExt cx="0" cy="0"/>
+        </a:xfrm>
+      </p:grpSpPr>
+      <p:sp>
+        <p:nvSpPr>
+          <p:cNvPr id="2" name="Rectángulo 1"/>
+          <p:cNvSpPr/>
+          <p:nvPr/>
+        </p:nvSpPr>
+        <p:spPr>
+          <a:xfrm>
+            <a:off x="225287" y="1060174"/>
+            <a:ext cx="11648661" cy="5340626"/>
+          </a:xfrm>
+          <a:prstGeom prst="rect">
+            <a:avLst/>
+          </a:prstGeom>
+          <a:gradFill flip="none" rotWithShape="1">
+            <a:gsLst>
+              <a:gs pos="0">
+                <a:schemeClr val="accent1">
+                  <a:tint val="66000"/>
+                  <a:satMod val="160000"/>
+                </a:schemeClr>
+              </a:gs>
+              <a:gs pos="50000">
+                <a:schemeClr val="accent1">
+                  <a:tint val="44500"/>
+                  <a:satMod val="160000"/>
+                </a:schemeClr>
+              </a:gs>
+              <a:gs pos="100000">
+                <a:schemeClr val="accent1">
+                  <a:tint val="23500"/>
+                  <a:satMod val="160000"/>
+                </a:schemeClr>
+              </a:gs>
+            </a:gsLst>
+            <a:path path="circle">
+              <a:fillToRect l="50000" t="50000" r="50000" b="50000"/>
+            </a:path>
+            <a:tileRect/>
+          </a:gradFill>
+          <a:ln w="9525" cap="flat" cmpd="sng" algn="ctr">
+            <a:solidFill>
+              <a:schemeClr val="dk1"/>
+            </a:solidFill>
+            <a:prstDash val="solid"/>
+            <a:round/>
+            <a:headEnd type="none" w="med" len="med"/>
+            <a:tailEnd type="none" w="med" len="med"/>
+          </a:ln>
+        </p:spPr>
+        <p:style>
+          <a:lnRef idx="0">
+            <a:scrgbClr r="0" g="0" b="0"/>
+          </a:lnRef>
+          <a:fillRef idx="0">
+            <a:scrgbClr r="0" g="0" b="0"/>
+          </a:fillRef>
+          <a:effectRef idx="0">
+            <a:scrgbClr r="0" g="0" b="0"/>
+          </a:effectRef>
+          <a:fontRef idx="minor">
+            <a:schemeClr val="dk1"/>
+          </a:fontRef>
+        </p:style>
+        <p:txBody>
+          <a:bodyPr rtlCol="0" anchor="ctr"/>
+          <a:lstStyle/>
+          <a:p>
+            <a:pPr algn="ctr"/>
+            <a:endParaRPr lang="es-GT"/>
+          </a:p>
+        </p:txBody>
+      </p:sp>
+      <p:pic>
+        <p:nvPicPr>
+          <p:cNvPr id="3" name="Imagen 2"/>
+          <p:cNvPicPr>
+            <a:picLocks noChangeAspect="1"/>
+          </p:cNvPicPr>
+          <p:nvPr/>
+        </p:nvPicPr>
+        <p:blipFill rotWithShape="1">
+          <a:blip r:embed="rId2">
+            <a:extLst>
+              <a:ext uri="{28A0092B-C50C-407E-A947-70E740481C1C}">
+                <a14:useLocalDpi xmlns:a14="http://schemas.microsoft.com/office/drawing/2010/main" val="0"/>
+              </a:ext>
+            </a:extLst>
+          </a:blip>
+          <a:srcRect l="22709" b="14423"/>
+          <a:stretch/>
+        </p:blipFill>
+        <p:spPr>
+          <a:xfrm>
+            <a:off x="225287" y="2783964"/>
+            <a:ext cx="4300396" cy="3616836"/>
+          </a:xfrm>
+          <a:prstGeom prst="rect">
+            <a:avLst/>
+          </a:prstGeom>
+        </p:spPr>
+      </p:pic>
+      <p:sp>
+        <p:nvSpPr>
+          <p:cNvPr id="4" name="Rectángulo 3"/>
+          <p:cNvSpPr/>
+          <p:nvPr/>
+        </p:nvSpPr>
+        <p:spPr>
+          <a:xfrm>
+            <a:off x="6864626" y="3087756"/>
+            <a:ext cx="2213113" cy="450574"/>
+          </a:xfrm>
+          <a:prstGeom prst="rect">
+            <a:avLst/>
+          </a:prstGeom>
+        </p:spPr>
+        <p:style>
+          <a:lnRef idx="2">
+            <a:schemeClr val="accent1"/>
+          </a:lnRef>
+          <a:fillRef idx="1">
+            <a:schemeClr val="lt1"/>
+          </a:fillRef>
+          <a:effectRef idx="0">
+            <a:schemeClr val="accent1"/>
+          </a:effectRef>
+          <a:fontRef idx="minor">
+            <a:schemeClr val="dk1"/>
+          </a:fontRef>
+        </p:style>
+        <p:txBody>
+          <a:bodyPr rtlCol="0" anchor="ctr"/>
+          <a:lstStyle/>
+          <a:p>
+            <a:r>
+              <a:rPr lang="es-GT" dirty="0">
+                <a:solidFill>
+                  <a:schemeClr val="bg1">
+                    <a:lumMod val="65000"/>
+                  </a:schemeClr>
+                </a:solidFill>
+              </a:rPr>
+              <a:t>Usuario</a:t>
+            </a:r>
+          </a:p>
+        </p:txBody>
+      </p:sp>
+      <p:sp>
+        <p:nvSpPr>
+          <p:cNvPr id="5" name="Rectángulo 4"/>
+          <p:cNvSpPr/>
+          <p:nvPr/>
+        </p:nvSpPr>
+        <p:spPr>
+          <a:xfrm>
+            <a:off x="6864626" y="3738120"/>
+            <a:ext cx="2213113" cy="450574"/>
+          </a:xfrm>
+          <a:prstGeom prst="rect">
+            <a:avLst/>
+          </a:prstGeom>
+        </p:spPr>
+        <p:style>
+          <a:lnRef idx="2">
+            <a:schemeClr val="accent1"/>
+          </a:lnRef>
+          <a:fillRef idx="1">
+            <a:schemeClr val="lt1"/>
+          </a:fillRef>
+          <a:effectRef idx="0">
+            <a:schemeClr val="accent1"/>
+          </a:effectRef>
+          <a:fontRef idx="minor">
+            <a:schemeClr val="dk1"/>
+          </a:fontRef>
+        </p:style>
+        <p:txBody>
+          <a:bodyPr rtlCol="0" anchor="ctr"/>
+          <a:lstStyle/>
+          <a:p>
+            <a:r>
+              <a:rPr lang="es-GT" dirty="0">
+                <a:solidFill>
+                  <a:schemeClr val="bg1">
+                    <a:lumMod val="65000"/>
+                  </a:schemeClr>
+                </a:solidFill>
+              </a:rPr>
+              <a:t>Contraseña</a:t>
+            </a:r>
+          </a:p>
+        </p:txBody>
+      </p:sp>
+      <p:sp>
+        <p:nvSpPr>
+          <p:cNvPr id="6" name="Rectángulo redondeado 5"/>
+          <p:cNvSpPr/>
+          <p:nvPr/>
+        </p:nvSpPr>
+        <p:spPr>
+          <a:xfrm>
+            <a:off x="8216348" y="4388484"/>
+            <a:ext cx="861391" cy="357809"/>
+          </a:xfrm>
+          <a:prstGeom prst="roundRect">
+            <a:avLst/>
+          </a:prstGeom>
+        </p:spPr>
+        <p:style>
+          <a:lnRef idx="0">
+            <a:schemeClr val="accent1"/>
+          </a:lnRef>
+          <a:fillRef idx="3">
+            <a:schemeClr val="accent1"/>
+          </a:fillRef>
+          <a:effectRef idx="3">
+            <a:schemeClr val="accent1"/>
+          </a:effectRef>
+          <a:fontRef idx="minor">
+            <a:schemeClr val="lt1"/>
+          </a:fontRef>
+        </p:style>
+        <p:txBody>
+          <a:bodyPr rtlCol="0" anchor="ctr"/>
+          <a:lstStyle/>
+          <a:p>
+            <a:pPr algn="ctr"/>
+            <a:r>
+              <a:rPr lang="es-GT" dirty="0"/>
+              <a:t>Iniciar</a:t>
+            </a:r>
+          </a:p>
+        </p:txBody>
+      </p:sp>
+      <p:sp>
+        <p:nvSpPr>
+          <p:cNvPr id="7" name="Rectángulo 6"/>
+          <p:cNvSpPr/>
+          <p:nvPr/>
+        </p:nvSpPr>
+        <p:spPr>
+          <a:xfrm>
+            <a:off x="1057897" y="1129457"/>
+            <a:ext cx="9983439" cy="1323439"/>
+          </a:xfrm>
+          <a:prstGeom prst="rect">
+            <a:avLst/>
+          </a:prstGeom>
+          <a:noFill/>
+        </p:spPr>
+        <p:txBody>
+          <a:bodyPr wrap="none" lIns="91440" tIns="45720" rIns="91440" bIns="45720">
+            <a:spAutoFit/>
+          </a:bodyPr>
+          <a:lstStyle/>
+          <a:p>
+            <a:pPr algn="ctr"/>
+            <a:r>
+              <a:rPr lang="es-ES" sz="4000" b="1" cap="none" spc="0" dirty="0">
+                <a:ln w="9525">
+                  <a:solidFill>
+                    <a:schemeClr val="bg1"/>
+                  </a:solidFill>
+                  <a:prstDash val="solid"/>
+                </a:ln>
+                <a:solidFill>
+                  <a:schemeClr val="accent5"/>
+                </a:solidFill>
+                <a:effectLst>
+                  <a:outerShdw blurRad="12700" dist="38100" dir="2700000" algn="tl" rotWithShape="0">
+                    <a:schemeClr val="accent5">
+                      <a:lumMod val="60000"/>
+                      <a:lumOff val="40000"/>
+                    </a:schemeClr>
+                  </a:outerShdw>
+                </a:effectLst>
+              </a:rPr>
+              <a:t>Sistema de Gestión de Información Estudiantil</a:t>
+            </a:r>
+          </a:p>
+          <a:p>
+            <a:pPr algn="ctr"/>
+            <a:r>
+              <a:rPr lang="es-ES" sz="4000" b="1" dirty="0">
+                <a:ln w="9525">
+                  <a:solidFill>
+                    <a:schemeClr val="bg1"/>
+                  </a:solidFill>
+                  <a:prstDash val="solid"/>
+                </a:ln>
+                <a:solidFill>
+                  <a:schemeClr val="accent5"/>
+                </a:solidFill>
+                <a:effectLst>
+                  <a:outerShdw blurRad="12700" dist="38100" dir="2700000" algn="tl" rotWithShape="0">
+                    <a:schemeClr val="accent5">
+                      <a:lumMod val="60000"/>
+                      <a:lumOff val="40000"/>
+                    </a:schemeClr>
+                  </a:outerShdw>
+                </a:effectLst>
+              </a:rPr>
+              <a:t>SIGIE</a:t>
+            </a:r>
+            <a:endParaRPr lang="es-ES" sz="4000" b="1" cap="none" spc="0" dirty="0">
+              <a:ln w="9525">
+                <a:solidFill>
+                  <a:schemeClr val="bg1"/>
+                </a:solidFill>
+                <a:prstDash val="solid"/>
+              </a:ln>
+              <a:solidFill>
+                <a:schemeClr val="accent5"/>
+              </a:solidFill>
+              <a:effectLst>
+                <a:outerShdw blurRad="12700" dist="38100" dir="2700000" algn="tl" rotWithShape="0">
+                  <a:schemeClr val="accent5">
+                    <a:lumMod val="60000"/>
+                    <a:lumOff val="40000"/>
+                  </a:schemeClr>
+                </a:outerShdw>
+              </a:effectLst>
+            </a:endParaRPr>
+          </a:p>
+        </p:txBody>
+      </p:sp>
+      <p:sp>
+        <p:nvSpPr>
+          <p:cNvPr id="8" name="CuadroTexto 7"/>
+          <p:cNvSpPr txBox="1"/>
+          <p:nvPr/>
+        </p:nvSpPr>
+        <p:spPr>
+          <a:xfrm>
+            <a:off x="1351722" y="357809"/>
+            <a:ext cx="1648208" cy="369332"/>
+          </a:xfrm>
+          <a:prstGeom prst="rect">
+            <a:avLst/>
+          </a:prstGeom>
+          <a:noFill/>
+        </p:spPr>
+        <p:txBody>
+          <a:bodyPr wrap="none" rtlCol="0">
+            <a:spAutoFit/>
+          </a:bodyPr>
+          <a:lstStyle/>
+          <a:p>
+            <a:r>
+              <a:rPr lang="es-GT" dirty="0"/>
+              <a:t>Inicio de Sesión</a:t>
+            </a:r>
+          </a:p>
+        </p:txBody>
+      </p:sp>
+    </p:spTree>
+    <p:extLst>
+      <p:ext uri="{BB962C8B-B14F-4D97-AF65-F5344CB8AC3E}">
+        <p14:creationId xmlns:p14="http://schemas.microsoft.com/office/powerpoint/2010/main" val="4006645328"/>
+      </p:ext>
+    </p:extLst>
+  </p:cSld>
+  <p:clrMapOvr>
+    <a:masterClrMapping/>
+  </p:clrMapOvr>
+</p:sld>
+</file>
+
+<file path=ppt/slides/slide3.xml><?xml version="1.0" encoding="utf-8"?>
+<p:sld xmlns:a="http://schemas.openxmlformats.org/drawingml/2006/main" xmlns:r="http://schemas.openxmlformats.org/officeDocument/2006/relationships" xmlns:p="http://schemas.openxmlformats.org/presentationml/2006/main">
+  <p:cSld>
+    <p:spTree>
+      <p:nvGrpSpPr>
+        <p:cNvPr id="1" name=""/>
+        <p:cNvGrpSpPr/>
+        <p:nvPr/>
+      </p:nvGrpSpPr>
+      <p:grpSpPr>
+        <a:xfrm>
+          <a:off x="0" y="0"/>
+          <a:ext cx="0" cy="0"/>
+          <a:chOff x="0" y="0"/>
+          <a:chExt cx="0" cy="0"/>
+        </a:xfrm>
+      </p:grpSpPr>
+      <p:sp>
+        <p:nvSpPr>
+          <p:cNvPr id="2" name="Rectángulo 1"/>
+          <p:cNvSpPr/>
+          <p:nvPr/>
+        </p:nvSpPr>
+        <p:spPr>
+          <a:xfrm>
+            <a:off x="225287" y="1060174"/>
+            <a:ext cx="11648661" cy="5340626"/>
+          </a:xfrm>
+          <a:prstGeom prst="rect">
+            <a:avLst/>
+          </a:prstGeom>
+          <a:gradFill flip="none" rotWithShape="1">
+            <a:gsLst>
+              <a:gs pos="0">
+                <a:schemeClr val="accent1">
+                  <a:tint val="66000"/>
+                  <a:satMod val="160000"/>
+                </a:schemeClr>
+              </a:gs>
+              <a:gs pos="50000">
+                <a:schemeClr val="accent1">
+                  <a:tint val="44500"/>
+                  <a:satMod val="160000"/>
+                </a:schemeClr>
+              </a:gs>
+              <a:gs pos="100000">
+                <a:schemeClr val="accent1">
+                  <a:tint val="23500"/>
+                  <a:satMod val="160000"/>
+                </a:schemeClr>
+              </a:gs>
+            </a:gsLst>
+            <a:path path="circle">
+              <a:fillToRect l="50000" t="50000" r="50000" b="50000"/>
+            </a:path>
+            <a:tileRect/>
+          </a:gradFill>
+          <a:ln w="9525" cap="flat" cmpd="sng" algn="ctr">
+            <a:solidFill>
+              <a:schemeClr val="dk1"/>
+            </a:solidFill>
+            <a:prstDash val="solid"/>
+            <a:round/>
+            <a:headEnd type="none" w="med" len="med"/>
+            <a:tailEnd type="none" w="med" len="med"/>
+          </a:ln>
+        </p:spPr>
+        <p:style>
+          <a:lnRef idx="0">
+            <a:scrgbClr r="0" g="0" b="0"/>
+          </a:lnRef>
+          <a:fillRef idx="0">
+            <a:scrgbClr r="0" g="0" b="0"/>
+          </a:fillRef>
+          <a:effectRef idx="0">
+            <a:scrgbClr r="0" g="0" b="0"/>
+          </a:effectRef>
+          <a:fontRef idx="minor">
+            <a:schemeClr val="dk1"/>
+          </a:fontRef>
+        </p:style>
+        <p:txBody>
+          <a:bodyPr rtlCol="0" anchor="ctr"/>
+          <a:lstStyle/>
+          <a:p>
+            <a:pPr algn="ctr"/>
+            <a:endParaRPr lang="es-GT"/>
+          </a:p>
+        </p:txBody>
+      </p:sp>
+      <p:pic>
+        <p:nvPicPr>
+          <p:cNvPr id="3" name="Imagen 2"/>
+          <p:cNvPicPr>
+            <a:picLocks noChangeAspect="1"/>
+          </p:cNvPicPr>
+          <p:nvPr/>
+        </p:nvPicPr>
+        <p:blipFill rotWithShape="1">
+          <a:blip r:embed="rId2">
+            <a:extLst>
+              <a:ext uri="{28A0092B-C50C-407E-A947-70E740481C1C}">
+                <a14:useLocalDpi xmlns:a14="http://schemas.microsoft.com/office/drawing/2010/main" val="0"/>
+              </a:ext>
+            </a:extLst>
+          </a:blip>
+          <a:stretch/>
+        </p:blipFill>
+        <p:spPr>
+          <a:xfrm>
+            <a:off x="3678110" y="1843059"/>
+            <a:ext cx="5240604" cy="3980844"/>
+          </a:xfrm>
+          <a:prstGeom prst="rect">
+            <a:avLst/>
+          </a:prstGeom>
+        </p:spPr>
+      </p:pic>
+      <p:sp>
+        <p:nvSpPr>
+          <p:cNvPr id="4" name="CuadroTexto 3"/>
+          <p:cNvSpPr txBox="1"/>
+          <p:nvPr/>
+        </p:nvSpPr>
+        <p:spPr>
+          <a:xfrm>
+            <a:off x="1351722" y="357809"/>
+            <a:ext cx="2642903" cy="369332"/>
+          </a:xfrm>
+          <a:prstGeom prst="rect">
+            <a:avLst/>
+          </a:prstGeom>
+          <a:noFill/>
+        </p:spPr>
+        <p:txBody>
+          <a:bodyPr wrap="none" rtlCol="0">
+            <a:spAutoFit/>
+          </a:bodyPr>
+          <a:lstStyle/>
+          <a:p>
+            <a:r>
+              <a:rPr lang="es-GT" dirty="0"/>
+              <a:t>Pagina de Inicio Secretaria</a:t>
+            </a:r>
+          </a:p>
+        </p:txBody>
+      </p:sp>
+      <p:sp>
+        <p:nvSpPr>
+          <p:cNvPr id="6" name="Esquina doblada 5"/>
+          <p:cNvSpPr/>
+          <p:nvPr/>
+        </p:nvSpPr>
+        <p:spPr>
+          <a:xfrm>
+            <a:off x="225286" y="3412435"/>
+            <a:ext cx="2777721" cy="834886"/>
+          </a:xfrm>
+          <a:prstGeom prst="foldedCorner">
+            <a:avLst/>
+          </a:prstGeom>
+        </p:spPr>
+        <p:style>
+          <a:lnRef idx="2">
+            <a:schemeClr val="accent1">
+              <a:shade val="50000"/>
+            </a:schemeClr>
+          </a:lnRef>
+          <a:fillRef idx="1">
+            <a:schemeClr val="accent1"/>
+          </a:fillRef>
+          <a:effectRef idx="0">
+            <a:schemeClr val="accent1"/>
+          </a:effectRef>
+          <a:fontRef idx="minor">
+            <a:schemeClr val="lt1"/>
+          </a:fontRef>
+        </p:style>
+        <p:txBody>
+          <a:bodyPr rtlCol="0" anchor="ctr"/>
+          <a:lstStyle/>
+          <a:p>
+            <a:pPr algn="ctr"/>
+            <a:endParaRPr lang="es-GT"/>
+          </a:p>
+        </p:txBody>
+      </p:sp>
+      <p:sp>
+        <p:nvSpPr>
+          <p:cNvPr id="7" name="Esquina doblada 6"/>
+          <p:cNvSpPr/>
+          <p:nvPr/>
+        </p:nvSpPr>
+        <p:spPr>
+          <a:xfrm>
+            <a:off x="225283" y="1676400"/>
+            <a:ext cx="2777721" cy="834886"/>
+          </a:xfrm>
+          <a:prstGeom prst="foldedCorner">
+            <a:avLst/>
+          </a:prstGeom>
+        </p:spPr>
+        <p:style>
+          <a:lnRef idx="2">
+            <a:schemeClr val="accent1">
+              <a:shade val="50000"/>
+            </a:schemeClr>
+          </a:lnRef>
+          <a:fillRef idx="1">
+            <a:schemeClr val="accent1"/>
+          </a:fillRef>
+          <a:effectRef idx="0">
+            <a:schemeClr val="accent1"/>
+          </a:effectRef>
+          <a:fontRef idx="minor">
+            <a:schemeClr val="lt1"/>
+          </a:fontRef>
+        </p:style>
+        <p:txBody>
+          <a:bodyPr rtlCol="0" anchor="ctr"/>
+          <a:lstStyle/>
+          <a:p>
+            <a:pPr algn="ctr"/>
+            <a:r>
+              <a:rPr lang="es-GT" dirty="0"/>
+              <a:t>Información de Personal</a:t>
+            </a:r>
+          </a:p>
+        </p:txBody>
+      </p:sp>
+      <p:sp>
+        <p:nvSpPr>
+          <p:cNvPr id="8" name="Esquina doblada 7"/>
+          <p:cNvSpPr/>
+          <p:nvPr/>
+        </p:nvSpPr>
+        <p:spPr>
+          <a:xfrm>
+            <a:off x="225284" y="3412435"/>
+            <a:ext cx="2777721" cy="834886"/>
+          </a:xfrm>
+          <a:prstGeom prst="foldedCorner">
+            <a:avLst/>
+          </a:prstGeom>
+        </p:spPr>
+        <p:style>
+          <a:lnRef idx="2">
+            <a:schemeClr val="accent1">
+              <a:shade val="50000"/>
+            </a:schemeClr>
+          </a:lnRef>
+          <a:fillRef idx="1">
+            <a:schemeClr val="accent1"/>
+          </a:fillRef>
+          <a:effectRef idx="0">
+            <a:schemeClr val="accent1"/>
+          </a:effectRef>
+          <a:fontRef idx="minor">
+            <a:schemeClr val="lt1"/>
+          </a:fontRef>
+        </p:style>
+        <p:txBody>
+          <a:bodyPr rtlCol="0" anchor="ctr"/>
+          <a:lstStyle/>
+          <a:p>
+            <a:pPr algn="ctr"/>
+            <a:r>
+              <a:rPr lang="es-GT" dirty="0"/>
+              <a:t>Pagos</a:t>
+            </a:r>
+          </a:p>
+        </p:txBody>
+      </p:sp>
+      <p:sp>
+        <p:nvSpPr>
+          <p:cNvPr id="9" name="Esquina doblada 8"/>
+          <p:cNvSpPr/>
+          <p:nvPr/>
+        </p:nvSpPr>
+        <p:spPr>
+          <a:xfrm>
+            <a:off x="225284" y="5148470"/>
+            <a:ext cx="2777721" cy="834886"/>
+          </a:xfrm>
+          <a:prstGeom prst="foldedCorner">
+            <a:avLst/>
+          </a:prstGeom>
+        </p:spPr>
+        <p:style>
+          <a:lnRef idx="0">
+            <a:schemeClr val="accent3"/>
+          </a:lnRef>
+          <a:fillRef idx="3">
+            <a:schemeClr val="accent3"/>
+          </a:fillRef>
+          <a:effectRef idx="3">
+            <a:schemeClr val="accent3"/>
+          </a:effectRef>
+          <a:fontRef idx="minor">
+            <a:schemeClr val="lt1"/>
+          </a:fontRef>
+        </p:style>
+        <p:txBody>
+          <a:bodyPr rtlCol="0" anchor="ctr"/>
+          <a:lstStyle/>
+          <a:p>
+            <a:pPr algn="ctr"/>
+            <a:r>
+              <a:rPr lang="es-GT" dirty="0"/>
+              <a:t>Administración</a:t>
+            </a:r>
+          </a:p>
+        </p:txBody>
+      </p:sp>
+      <p:sp>
+        <p:nvSpPr>
+          <p:cNvPr id="17" name="Esquina doblada 16"/>
+          <p:cNvSpPr/>
+          <p:nvPr/>
+        </p:nvSpPr>
+        <p:spPr>
+          <a:xfrm flipH="1">
+            <a:off x="9096227" y="1676400"/>
+            <a:ext cx="2777721" cy="834886"/>
+          </a:xfrm>
+          <a:prstGeom prst="foldedCorner">
+            <a:avLst/>
+          </a:prstGeom>
+        </p:spPr>
+        <p:style>
+          <a:lnRef idx="2">
+            <a:schemeClr val="accent1">
+              <a:shade val="50000"/>
+            </a:schemeClr>
+          </a:lnRef>
+          <a:fillRef idx="1">
+            <a:schemeClr val="accent1"/>
+          </a:fillRef>
+          <a:effectRef idx="0">
+            <a:schemeClr val="accent1"/>
+          </a:effectRef>
+          <a:fontRef idx="minor">
+            <a:schemeClr val="lt1"/>
+          </a:fontRef>
+        </p:style>
+        <p:txBody>
+          <a:bodyPr rtlCol="0" anchor="ctr"/>
+          <a:lstStyle/>
+          <a:p>
+            <a:pPr algn="ctr"/>
+            <a:r>
+              <a:rPr lang="es-GT" dirty="0"/>
+              <a:t>Inscripción</a:t>
+            </a:r>
+          </a:p>
+        </p:txBody>
+      </p:sp>
+      <p:sp>
+        <p:nvSpPr>
+          <p:cNvPr id="18" name="Esquina doblada 17"/>
+          <p:cNvSpPr/>
+          <p:nvPr/>
+        </p:nvSpPr>
+        <p:spPr>
+          <a:xfrm flipH="1">
+            <a:off x="9096226" y="3313044"/>
+            <a:ext cx="2777721" cy="834886"/>
+          </a:xfrm>
+          <a:prstGeom prst="foldedCorner">
+            <a:avLst/>
+          </a:prstGeom>
+        </p:spPr>
+        <p:style>
+          <a:lnRef idx="2">
+            <a:schemeClr val="accent1">
+              <a:shade val="50000"/>
+            </a:schemeClr>
+          </a:lnRef>
+          <a:fillRef idx="1">
+            <a:schemeClr val="accent1"/>
+          </a:fillRef>
+          <a:effectRef idx="0">
+            <a:schemeClr val="accent1"/>
+          </a:effectRef>
+          <a:fontRef idx="minor">
+            <a:schemeClr val="lt1"/>
+          </a:fontRef>
+        </p:style>
+        <p:txBody>
+          <a:bodyPr rtlCol="0" anchor="ctr"/>
+          <a:lstStyle/>
+          <a:p>
+            <a:pPr algn="ctr"/>
+            <a:r>
+              <a:rPr lang="es-GT" dirty="0"/>
+              <a:t>Notas</a:t>
+            </a:r>
+          </a:p>
+        </p:txBody>
+      </p:sp>
+      <p:sp>
+        <p:nvSpPr>
+          <p:cNvPr id="19" name="Esquina doblada 18"/>
+          <p:cNvSpPr/>
+          <p:nvPr/>
+        </p:nvSpPr>
+        <p:spPr>
+          <a:xfrm flipH="1">
+            <a:off x="9096225" y="5148470"/>
+            <a:ext cx="2777721" cy="834886"/>
+          </a:xfrm>
+          <a:prstGeom prst="foldedCorner">
+            <a:avLst/>
+          </a:prstGeom>
+        </p:spPr>
+        <p:style>
+          <a:lnRef idx="2">
+            <a:schemeClr val="accent1">
+              <a:shade val="50000"/>
+            </a:schemeClr>
+          </a:lnRef>
+          <a:fillRef idx="1">
+            <a:schemeClr val="accent1"/>
+          </a:fillRef>
+          <a:effectRef idx="0">
+            <a:schemeClr val="accent1"/>
+          </a:effectRef>
+          <a:fontRef idx="minor">
+            <a:schemeClr val="lt1"/>
+          </a:fontRef>
+        </p:style>
+        <p:txBody>
+          <a:bodyPr rtlCol="0" anchor="ctr"/>
+          <a:lstStyle/>
+          <a:p>
+            <a:pPr algn="ctr"/>
+            <a:r>
+              <a:rPr lang="es-GT" dirty="0"/>
+              <a:t>Listados</a:t>
+            </a:r>
+          </a:p>
+        </p:txBody>
+      </p:sp>
+      <p:sp>
+        <p:nvSpPr>
+          <p:cNvPr id="20" name="Rectángulo 19"/>
+          <p:cNvSpPr/>
+          <p:nvPr/>
+        </p:nvSpPr>
+        <p:spPr>
+          <a:xfrm>
+            <a:off x="5628198" y="1135173"/>
+            <a:ext cx="1276311" cy="707886"/>
+          </a:xfrm>
+          <a:prstGeom prst="rect">
+            <a:avLst/>
+          </a:prstGeom>
+          <a:noFill/>
+        </p:spPr>
+        <p:txBody>
+          <a:bodyPr wrap="none" lIns="91440" tIns="45720" rIns="91440" bIns="45720">
+            <a:spAutoFit/>
+          </a:bodyPr>
+          <a:lstStyle/>
+          <a:p>
+            <a:pPr algn="ctr"/>
+            <a:r>
+              <a:rPr lang="es-ES" sz="4000" b="1" dirty="0">
+                <a:ln w="9525">
+                  <a:solidFill>
+                    <a:schemeClr val="bg1"/>
+                  </a:solidFill>
+                  <a:prstDash val="solid"/>
+                </a:ln>
+                <a:solidFill>
+                  <a:schemeClr val="accent5"/>
+                </a:solidFill>
+                <a:effectLst>
+                  <a:outerShdw blurRad="12700" dist="38100" dir="2700000" algn="tl" rotWithShape="0">
+                    <a:schemeClr val="accent5">
+                      <a:lumMod val="60000"/>
+                      <a:lumOff val="40000"/>
+                    </a:schemeClr>
+                  </a:outerShdw>
+                </a:effectLst>
+              </a:rPr>
+              <a:t>SIGIE</a:t>
+            </a:r>
+            <a:endParaRPr lang="es-ES" sz="4000" b="1" cap="none" spc="0" dirty="0">
+              <a:ln w="9525">
+                <a:solidFill>
+                  <a:schemeClr val="bg1"/>
+                </a:solidFill>
+                <a:prstDash val="solid"/>
+              </a:ln>
+              <a:solidFill>
+                <a:schemeClr val="accent5"/>
+              </a:solidFill>
+              <a:effectLst>
+                <a:outerShdw blurRad="12700" dist="38100" dir="2700000" algn="tl" rotWithShape="0">
+                  <a:schemeClr val="accent5">
+                    <a:lumMod val="60000"/>
+                    <a:lumOff val="40000"/>
+                  </a:schemeClr>
+                </a:outerShdw>
+              </a:effectLst>
+            </a:endParaRPr>
+          </a:p>
+        </p:txBody>
+      </p:sp>
+      <p:sp>
+        <p:nvSpPr>
+          <p:cNvPr id="21" name="Rectángulo 20"/>
+          <p:cNvSpPr/>
+          <p:nvPr/>
+        </p:nvSpPr>
+        <p:spPr>
+          <a:xfrm>
+            <a:off x="5628198" y="5692914"/>
+            <a:ext cx="1340432" cy="707886"/>
+          </a:xfrm>
+          <a:prstGeom prst="rect">
+            <a:avLst/>
+          </a:prstGeom>
+          <a:noFill/>
+        </p:spPr>
+        <p:txBody>
+          <a:bodyPr wrap="none" lIns="91440" tIns="45720" rIns="91440" bIns="45720">
+            <a:spAutoFit/>
+          </a:bodyPr>
+          <a:lstStyle/>
+          <a:p>
+            <a:pPr algn="ctr"/>
+            <a:r>
+              <a:rPr lang="es-ES" sz="4000" b="1" dirty="0">
+                <a:ln w="9525">
+                  <a:solidFill>
+                    <a:schemeClr val="bg1"/>
+                  </a:solidFill>
+                  <a:prstDash val="solid"/>
+                </a:ln>
+                <a:solidFill>
+                  <a:schemeClr val="accent5"/>
+                </a:solidFill>
+                <a:effectLst>
+                  <a:outerShdw blurRad="12700" dist="38100" dir="2700000" algn="tl" rotWithShape="0">
+                    <a:schemeClr val="accent5">
+                      <a:lumMod val="60000"/>
+                      <a:lumOff val="40000"/>
+                    </a:schemeClr>
+                  </a:outerShdw>
+                </a:effectLst>
+              </a:rPr>
+              <a:t>Inicio</a:t>
+            </a:r>
+            <a:endParaRPr lang="es-ES" sz="4000" b="1" cap="none" spc="0" dirty="0">
+              <a:ln w="9525">
+                <a:solidFill>
+                  <a:schemeClr val="bg1"/>
+                </a:solidFill>
+                <a:prstDash val="solid"/>
+              </a:ln>
+              <a:solidFill>
+                <a:schemeClr val="accent5"/>
+              </a:solidFill>
+              <a:effectLst>
+                <a:outerShdw blurRad="12700" dist="38100" dir="2700000" algn="tl" rotWithShape="0">
+                  <a:schemeClr val="accent5">
+                    <a:lumMod val="60000"/>
+                    <a:lumOff val="40000"/>
+                  </a:schemeClr>
+                </a:outerShdw>
+              </a:effectLst>
+            </a:endParaRPr>
+          </a:p>
+        </p:txBody>
+      </p:sp>
+      <p:sp>
+        <p:nvSpPr>
+          <p:cNvPr id="22" name="Esquina doblada 21"/>
+          <p:cNvSpPr/>
+          <p:nvPr/>
+        </p:nvSpPr>
+        <p:spPr>
+          <a:xfrm flipH="1">
+            <a:off x="10376452" y="1060174"/>
+            <a:ext cx="1497494" cy="397564"/>
+          </a:xfrm>
+          <a:prstGeom prst="foldedCorner">
+            <a:avLst/>
+          </a:prstGeom>
+        </p:spPr>
+        <p:style>
+          <a:lnRef idx="2">
+            <a:schemeClr val="accent5"/>
+          </a:lnRef>
+          <a:fillRef idx="1">
+            <a:schemeClr val="lt1"/>
+          </a:fillRef>
+          <a:effectRef idx="0">
+            <a:schemeClr val="accent5"/>
+          </a:effectRef>
+          <a:fontRef idx="minor">
+            <a:schemeClr val="dk1"/>
+          </a:fontRef>
+        </p:style>
+        <p:txBody>
+          <a:bodyPr rtlCol="0" anchor="ctr"/>
+          <a:lstStyle/>
+          <a:p>
+            <a:pPr algn="ctr"/>
+            <a:r>
+              <a:rPr lang="es-GT" dirty="0">
+                <a:solidFill>
+                  <a:schemeClr val="accent1">
+                    <a:lumMod val="75000"/>
+                  </a:schemeClr>
+                </a:solidFill>
+              </a:rPr>
+              <a:t>Cerrar Sesión</a:t>
+            </a:r>
+          </a:p>
+        </p:txBody>
+      </p:sp>
+      <p:sp>
+        <p:nvSpPr>
+          <p:cNvPr id="23" name="Esquina doblada 22"/>
+          <p:cNvSpPr/>
+          <p:nvPr/>
+        </p:nvSpPr>
+        <p:spPr>
+          <a:xfrm>
+            <a:off x="225283" y="1060174"/>
+            <a:ext cx="1497495" cy="397564"/>
+          </a:xfrm>
+          <a:prstGeom prst="foldedCorner">
+            <a:avLst/>
+          </a:prstGeom>
+        </p:spPr>
+        <p:style>
+          <a:lnRef idx="2">
+            <a:schemeClr val="accent5"/>
+          </a:lnRef>
+          <a:fillRef idx="1">
+            <a:schemeClr val="lt1"/>
+          </a:fillRef>
+          <a:effectRef idx="0">
+            <a:schemeClr val="accent5"/>
+          </a:effectRef>
+          <a:fontRef idx="minor">
+            <a:schemeClr val="dk1"/>
+          </a:fontRef>
+        </p:style>
+        <p:txBody>
+          <a:bodyPr rtlCol="0" anchor="ctr"/>
+          <a:lstStyle/>
+          <a:p>
+            <a:pPr algn="ctr"/>
+            <a:r>
+              <a:rPr lang="es-GT" sz="1400" dirty="0">
+                <a:solidFill>
+                  <a:schemeClr val="accent1">
+                    <a:lumMod val="75000"/>
+                  </a:schemeClr>
+                </a:solidFill>
+              </a:rPr>
+              <a:t>“Usuario Activo”</a:t>
+            </a:r>
+          </a:p>
+        </p:txBody>
+      </p:sp>
+    </p:spTree>
+    <p:extLst>
+      <p:ext uri="{BB962C8B-B14F-4D97-AF65-F5344CB8AC3E}">
+        <p14:creationId xmlns:p14="http://schemas.microsoft.com/office/powerpoint/2010/main" val="3318260324"/>
+      </p:ext>
+    </p:extLst>
+  </p:cSld>
+  <p:clrMapOvr>
+    <a:masterClrMapping/>
+  </p:clrMapOvr>
+</p:sld>
+</file>
+
+<file path=ppt/slides/slide4.xml><?xml version="1.0" encoding="utf-8"?>
+<p:sld xmlns:a="http://schemas.openxmlformats.org/drawingml/2006/main" xmlns:r="http://schemas.openxmlformats.org/officeDocument/2006/relationships" xmlns:p="http://schemas.openxmlformats.org/presentationml/2006/main">
+  <p:cSld>
+    <p:spTree>
+      <p:nvGrpSpPr>
+        <p:cNvPr id="1" name=""/>
+        <p:cNvGrpSpPr/>
+        <p:nvPr/>
+      </p:nvGrpSpPr>
+      <p:grpSpPr>
+        <a:xfrm>
+          <a:off x="0" y="0"/>
+          <a:ext cx="0" cy="0"/>
+          <a:chOff x="0" y="0"/>
+          <a:chExt cx="0" cy="0"/>
+        </a:xfrm>
+      </p:grpSpPr>
+      <p:sp>
+        <p:nvSpPr>
+          <p:cNvPr id="2" name="Rectángulo 1"/>
+          <p:cNvSpPr/>
+          <p:nvPr/>
+        </p:nvSpPr>
+        <p:spPr>
+          <a:xfrm>
+            <a:off x="225287" y="1060174"/>
+            <a:ext cx="11648661" cy="5340626"/>
+          </a:xfrm>
+          <a:prstGeom prst="rect">
+            <a:avLst/>
+          </a:prstGeom>
+          <a:gradFill flip="none" rotWithShape="1">
+            <a:gsLst>
+              <a:gs pos="0">
+                <a:schemeClr val="accent1">
+                  <a:tint val="66000"/>
+                  <a:satMod val="160000"/>
+                </a:schemeClr>
+              </a:gs>
+              <a:gs pos="50000">
+                <a:schemeClr val="accent1">
+                  <a:tint val="44500"/>
+                  <a:satMod val="160000"/>
+                </a:schemeClr>
+              </a:gs>
+              <a:gs pos="100000">
+                <a:schemeClr val="accent1">
+                  <a:tint val="23500"/>
+                  <a:satMod val="160000"/>
+                </a:schemeClr>
+              </a:gs>
+            </a:gsLst>
+            <a:path path="circle">
+              <a:fillToRect l="50000" t="50000" r="50000" b="50000"/>
+            </a:path>
+            <a:tileRect/>
+          </a:gradFill>
+          <a:ln w="9525" cap="flat" cmpd="sng" algn="ctr">
+            <a:solidFill>
+              <a:schemeClr val="dk1"/>
+            </a:solidFill>
+            <a:prstDash val="solid"/>
+            <a:round/>
+            <a:headEnd type="none" w="med" len="med"/>
+            <a:tailEnd type="none" w="med" len="med"/>
+          </a:ln>
+        </p:spPr>
+        <p:style>
+          <a:lnRef idx="0">
+            <a:scrgbClr r="0" g="0" b="0"/>
+          </a:lnRef>
+          <a:fillRef idx="0">
+            <a:scrgbClr r="0" g="0" b="0"/>
+          </a:fillRef>
+          <a:effectRef idx="0">
+            <a:scrgbClr r="0" g="0" b="0"/>
+          </a:effectRef>
+          <a:fontRef idx="minor">
+            <a:schemeClr val="dk1"/>
+          </a:fontRef>
+        </p:style>
+        <p:txBody>
+          <a:bodyPr rtlCol="0" anchor="ctr"/>
+          <a:lstStyle/>
+          <a:p>
+            <a:pPr algn="ctr"/>
+            <a:endParaRPr lang="es-GT"/>
+          </a:p>
+        </p:txBody>
+      </p:sp>
+      <p:pic>
+        <p:nvPicPr>
+          <p:cNvPr id="3" name="Imagen 2"/>
+          <p:cNvPicPr>
+            <a:picLocks noChangeAspect="1"/>
+          </p:cNvPicPr>
+          <p:nvPr/>
+        </p:nvPicPr>
+        <p:blipFill rotWithShape="1">
+          <a:blip r:embed="rId2">
+            <a:extLst>
+              <a:ext uri="{28A0092B-C50C-407E-A947-70E740481C1C}">
+                <a14:useLocalDpi xmlns:a14="http://schemas.microsoft.com/office/drawing/2010/main" val="0"/>
+              </a:ext>
+            </a:extLst>
+          </a:blip>
+          <a:stretch/>
+        </p:blipFill>
+        <p:spPr>
+          <a:xfrm>
+            <a:off x="3678110" y="1843059"/>
+            <a:ext cx="5240604" cy="3980844"/>
+          </a:xfrm>
+          <a:prstGeom prst="rect">
+            <a:avLst/>
+          </a:prstGeom>
+        </p:spPr>
+      </p:pic>
+      <p:sp>
+        <p:nvSpPr>
+          <p:cNvPr id="4" name="CuadroTexto 3"/>
+          <p:cNvSpPr txBox="1"/>
+          <p:nvPr/>
+        </p:nvSpPr>
+        <p:spPr>
+          <a:xfrm>
+            <a:off x="1351722" y="357809"/>
+            <a:ext cx="3045001" cy="369332"/>
+          </a:xfrm>
+          <a:prstGeom prst="rect">
+            <a:avLst/>
+          </a:prstGeom>
+          <a:noFill/>
+        </p:spPr>
+        <p:txBody>
+          <a:bodyPr wrap="none" rtlCol="0">
+            <a:spAutoFit/>
+          </a:bodyPr>
+          <a:lstStyle/>
+          <a:p>
+            <a:r>
+              <a:rPr lang="es-GT" dirty="0"/>
+              <a:t>Pagina de Inicio Administrador</a:t>
+            </a:r>
+          </a:p>
+        </p:txBody>
+      </p:sp>
+      <p:sp>
+        <p:nvSpPr>
+          <p:cNvPr id="6" name="Esquina doblada 5"/>
+          <p:cNvSpPr/>
+          <p:nvPr/>
+        </p:nvSpPr>
+        <p:spPr>
+          <a:xfrm>
+            <a:off x="225286" y="3412435"/>
+            <a:ext cx="2777721" cy="834886"/>
+          </a:xfrm>
+          <a:prstGeom prst="foldedCorner">
+            <a:avLst/>
+          </a:prstGeom>
+        </p:spPr>
+        <p:style>
+          <a:lnRef idx="2">
+            <a:schemeClr val="accent1">
+              <a:shade val="50000"/>
+            </a:schemeClr>
+          </a:lnRef>
+          <a:fillRef idx="1">
+            <a:schemeClr val="accent1"/>
+          </a:fillRef>
+          <a:effectRef idx="0">
+            <a:schemeClr val="accent1"/>
+          </a:effectRef>
+          <a:fontRef idx="minor">
+            <a:schemeClr val="lt1"/>
+          </a:fontRef>
+        </p:style>
+        <p:txBody>
+          <a:bodyPr rtlCol="0" anchor="ctr"/>
+          <a:lstStyle/>
+          <a:p>
+            <a:pPr algn="ctr"/>
+            <a:endParaRPr lang="es-GT"/>
+          </a:p>
+        </p:txBody>
+      </p:sp>
+      <p:sp>
+        <p:nvSpPr>
+          <p:cNvPr id="7" name="Esquina doblada 6"/>
+          <p:cNvSpPr/>
+          <p:nvPr/>
+        </p:nvSpPr>
+        <p:spPr>
+          <a:xfrm>
+            <a:off x="225283" y="1676400"/>
+            <a:ext cx="2777721" cy="834886"/>
+          </a:xfrm>
+          <a:prstGeom prst="foldedCorner">
+            <a:avLst/>
+          </a:prstGeom>
+        </p:spPr>
+        <p:style>
+          <a:lnRef idx="2">
+            <a:schemeClr val="accent1">
+              <a:shade val="50000"/>
+            </a:schemeClr>
+          </a:lnRef>
+          <a:fillRef idx="1">
+            <a:schemeClr val="accent1"/>
+          </a:fillRef>
+          <a:effectRef idx="0">
+            <a:schemeClr val="accent1"/>
+          </a:effectRef>
+          <a:fontRef idx="minor">
+            <a:schemeClr val="lt1"/>
+          </a:fontRef>
+        </p:style>
+        <p:txBody>
+          <a:bodyPr rtlCol="0" anchor="ctr"/>
+          <a:lstStyle/>
+          <a:p>
+            <a:pPr algn="ctr"/>
+            <a:r>
+              <a:rPr lang="es-GT" dirty="0"/>
+              <a:t>Información de Personal</a:t>
+            </a:r>
+          </a:p>
+        </p:txBody>
+      </p:sp>
+      <p:sp>
+        <p:nvSpPr>
+          <p:cNvPr id="8" name="Esquina doblada 7"/>
+          <p:cNvSpPr/>
+          <p:nvPr/>
+        </p:nvSpPr>
+        <p:spPr>
+          <a:xfrm>
+            <a:off x="225284" y="3412435"/>
+            <a:ext cx="2777721" cy="834886"/>
+          </a:xfrm>
+          <a:prstGeom prst="foldedCorner">
+            <a:avLst/>
+          </a:prstGeom>
+        </p:spPr>
+        <p:style>
+          <a:lnRef idx="2">
+            <a:schemeClr val="accent1">
+              <a:shade val="50000"/>
+            </a:schemeClr>
+          </a:lnRef>
+          <a:fillRef idx="1">
+            <a:schemeClr val="accent1"/>
+          </a:fillRef>
+          <a:effectRef idx="0">
+            <a:schemeClr val="accent1"/>
+          </a:effectRef>
+          <a:fontRef idx="minor">
+            <a:schemeClr val="lt1"/>
+          </a:fontRef>
+        </p:style>
+        <p:txBody>
+          <a:bodyPr rtlCol="0" anchor="ctr"/>
+          <a:lstStyle/>
+          <a:p>
+            <a:pPr algn="ctr"/>
+            <a:r>
+              <a:rPr lang="es-GT" dirty="0"/>
+              <a:t>Pagos</a:t>
+            </a:r>
+          </a:p>
+        </p:txBody>
+      </p:sp>
+      <p:sp>
+        <p:nvSpPr>
+          <p:cNvPr id="9" name="Esquina doblada 8"/>
+          <p:cNvSpPr/>
+          <p:nvPr/>
+        </p:nvSpPr>
+        <p:spPr>
+          <a:xfrm>
+            <a:off x="225284" y="5148470"/>
+            <a:ext cx="2777721" cy="834886"/>
+          </a:xfrm>
+          <a:prstGeom prst="foldedCorner">
+            <a:avLst/>
+          </a:prstGeom>
+        </p:spPr>
+        <p:style>
+          <a:lnRef idx="2">
+            <a:schemeClr val="accent1">
+              <a:shade val="50000"/>
+            </a:schemeClr>
+          </a:lnRef>
+          <a:fillRef idx="1">
+            <a:schemeClr val="accent1"/>
+          </a:fillRef>
+          <a:effectRef idx="0">
+            <a:schemeClr val="accent1"/>
+          </a:effectRef>
+          <a:fontRef idx="minor">
+            <a:schemeClr val="lt1"/>
+          </a:fontRef>
+        </p:style>
+        <p:txBody>
+          <a:bodyPr rtlCol="0" anchor="ctr"/>
+          <a:lstStyle/>
+          <a:p>
+            <a:pPr algn="ctr"/>
+            <a:r>
+              <a:rPr lang="es-GT" dirty="0"/>
+              <a:t>Administración</a:t>
+            </a:r>
+          </a:p>
+        </p:txBody>
+      </p:sp>
+      <p:sp>
+        <p:nvSpPr>
+          <p:cNvPr id="17" name="Esquina doblada 16"/>
+          <p:cNvSpPr/>
+          <p:nvPr/>
+        </p:nvSpPr>
+        <p:spPr>
+          <a:xfrm flipH="1">
+            <a:off x="9096227" y="1676400"/>
+            <a:ext cx="2777721" cy="834886"/>
+          </a:xfrm>
+          <a:prstGeom prst="foldedCorner">
+            <a:avLst/>
+          </a:prstGeom>
+        </p:spPr>
+        <p:style>
+          <a:lnRef idx="2">
+            <a:schemeClr val="accent1">
+              <a:shade val="50000"/>
+            </a:schemeClr>
+          </a:lnRef>
+          <a:fillRef idx="1">
+            <a:schemeClr val="accent1"/>
+          </a:fillRef>
+          <a:effectRef idx="0">
+            <a:schemeClr val="accent1"/>
+          </a:effectRef>
+          <a:fontRef idx="minor">
+            <a:schemeClr val="lt1"/>
+          </a:fontRef>
+        </p:style>
+        <p:txBody>
+          <a:bodyPr rtlCol="0" anchor="ctr"/>
+          <a:lstStyle/>
+          <a:p>
+            <a:pPr algn="ctr"/>
+            <a:r>
+              <a:rPr lang="es-GT" dirty="0"/>
+              <a:t>Inscripción</a:t>
+            </a:r>
+          </a:p>
+        </p:txBody>
+      </p:sp>
+      <p:sp>
+        <p:nvSpPr>
+          <p:cNvPr id="18" name="Esquina doblada 17"/>
+          <p:cNvSpPr/>
+          <p:nvPr/>
+        </p:nvSpPr>
+        <p:spPr>
+          <a:xfrm flipH="1">
+            <a:off x="9096226" y="3313044"/>
+            <a:ext cx="2777721" cy="834886"/>
+          </a:xfrm>
+          <a:prstGeom prst="foldedCorner">
+            <a:avLst/>
+          </a:prstGeom>
+        </p:spPr>
+        <p:style>
+          <a:lnRef idx="2">
+            <a:schemeClr val="accent1">
+              <a:shade val="50000"/>
+            </a:schemeClr>
+          </a:lnRef>
+          <a:fillRef idx="1">
+            <a:schemeClr val="accent1"/>
+          </a:fillRef>
+          <a:effectRef idx="0">
+            <a:schemeClr val="accent1"/>
+          </a:effectRef>
+          <a:fontRef idx="minor">
+            <a:schemeClr val="lt1"/>
+          </a:fontRef>
+        </p:style>
+        <p:txBody>
+          <a:bodyPr rtlCol="0" anchor="ctr"/>
+          <a:lstStyle/>
+          <a:p>
+            <a:pPr algn="ctr"/>
+            <a:r>
+              <a:rPr lang="es-GT" dirty="0"/>
+              <a:t>Notas</a:t>
+            </a:r>
+          </a:p>
+        </p:txBody>
+      </p:sp>
+      <p:sp>
+        <p:nvSpPr>
+          <p:cNvPr id="19" name="Esquina doblada 18"/>
+          <p:cNvSpPr/>
+          <p:nvPr/>
+        </p:nvSpPr>
+        <p:spPr>
+          <a:xfrm flipH="1">
+            <a:off x="9096225" y="5148470"/>
+            <a:ext cx="2777721" cy="834886"/>
+          </a:xfrm>
+          <a:prstGeom prst="foldedCorner">
+            <a:avLst/>
+          </a:prstGeom>
+        </p:spPr>
+        <p:style>
+          <a:lnRef idx="2">
+            <a:schemeClr val="accent1">
+              <a:shade val="50000"/>
+            </a:schemeClr>
+          </a:lnRef>
+          <a:fillRef idx="1">
+            <a:schemeClr val="accent1"/>
+          </a:fillRef>
+          <a:effectRef idx="0">
+            <a:schemeClr val="accent1"/>
+          </a:effectRef>
+          <a:fontRef idx="minor">
+            <a:schemeClr val="lt1"/>
+          </a:fontRef>
+        </p:style>
+        <p:txBody>
+          <a:bodyPr rtlCol="0" anchor="ctr"/>
+          <a:lstStyle/>
+          <a:p>
+            <a:pPr algn="ctr"/>
+            <a:r>
+              <a:rPr lang="es-GT" dirty="0"/>
+              <a:t>Listados</a:t>
+            </a:r>
+          </a:p>
+        </p:txBody>
+      </p:sp>
+      <p:sp>
+        <p:nvSpPr>
+          <p:cNvPr id="20" name="Rectángulo 19"/>
+          <p:cNvSpPr/>
+          <p:nvPr/>
+        </p:nvSpPr>
+        <p:spPr>
+          <a:xfrm>
+            <a:off x="5628198" y="1135173"/>
+            <a:ext cx="1276311" cy="707886"/>
+          </a:xfrm>
+          <a:prstGeom prst="rect">
+            <a:avLst/>
+          </a:prstGeom>
+          <a:noFill/>
+        </p:spPr>
+        <p:txBody>
+          <a:bodyPr wrap="none" lIns="91440" tIns="45720" rIns="91440" bIns="45720">
+            <a:spAutoFit/>
+          </a:bodyPr>
+          <a:lstStyle/>
+          <a:p>
+            <a:pPr algn="ctr"/>
+            <a:r>
+              <a:rPr lang="es-ES" sz="4000" b="1" dirty="0">
+                <a:ln w="9525">
+                  <a:solidFill>
+                    <a:schemeClr val="bg1"/>
+                  </a:solidFill>
+                  <a:prstDash val="solid"/>
+                </a:ln>
+                <a:solidFill>
+                  <a:schemeClr val="accent5"/>
+                </a:solidFill>
+                <a:effectLst>
+                  <a:outerShdw blurRad="12700" dist="38100" dir="2700000" algn="tl" rotWithShape="0">
+                    <a:schemeClr val="accent5">
+                      <a:lumMod val="60000"/>
+                      <a:lumOff val="40000"/>
+                    </a:schemeClr>
+                  </a:outerShdw>
+                </a:effectLst>
+              </a:rPr>
+              <a:t>SIGIE</a:t>
+            </a:r>
+            <a:endParaRPr lang="es-ES" sz="4000" b="1" cap="none" spc="0" dirty="0">
+              <a:ln w="9525">
+                <a:solidFill>
+                  <a:schemeClr val="bg1"/>
+                </a:solidFill>
+                <a:prstDash val="solid"/>
+              </a:ln>
+              <a:solidFill>
+                <a:schemeClr val="accent5"/>
+              </a:solidFill>
+              <a:effectLst>
+                <a:outerShdw blurRad="12700" dist="38100" dir="2700000" algn="tl" rotWithShape="0">
+                  <a:schemeClr val="accent5">
+                    <a:lumMod val="60000"/>
+                    <a:lumOff val="40000"/>
+                  </a:schemeClr>
+                </a:outerShdw>
+              </a:effectLst>
+            </a:endParaRPr>
+          </a:p>
+        </p:txBody>
+      </p:sp>
+      <p:sp>
+        <p:nvSpPr>
+          <p:cNvPr id="21" name="Rectángulo 20"/>
+          <p:cNvSpPr/>
+          <p:nvPr/>
+        </p:nvSpPr>
+        <p:spPr>
+          <a:xfrm>
+            <a:off x="5628198" y="5692914"/>
+            <a:ext cx="1340432" cy="707886"/>
+          </a:xfrm>
+          <a:prstGeom prst="rect">
+            <a:avLst/>
+          </a:prstGeom>
+          <a:noFill/>
+        </p:spPr>
+        <p:txBody>
+          <a:bodyPr wrap="none" lIns="91440" tIns="45720" rIns="91440" bIns="45720">
+            <a:spAutoFit/>
+          </a:bodyPr>
+          <a:lstStyle/>
+          <a:p>
+            <a:pPr algn="ctr"/>
+            <a:r>
+              <a:rPr lang="es-ES" sz="4000" b="1" dirty="0">
+                <a:ln w="9525">
+                  <a:solidFill>
+                    <a:schemeClr val="bg1"/>
+                  </a:solidFill>
+                  <a:prstDash val="solid"/>
+                </a:ln>
+                <a:solidFill>
+                  <a:schemeClr val="accent5"/>
+                </a:solidFill>
+                <a:effectLst>
+                  <a:outerShdw blurRad="12700" dist="38100" dir="2700000" algn="tl" rotWithShape="0">
+                    <a:schemeClr val="accent5">
+                      <a:lumMod val="60000"/>
+                      <a:lumOff val="40000"/>
+                    </a:schemeClr>
+                  </a:outerShdw>
+                </a:effectLst>
+              </a:rPr>
+              <a:t>Inicio</a:t>
+            </a:r>
+            <a:endParaRPr lang="es-ES" sz="4000" b="1" cap="none" spc="0" dirty="0">
+              <a:ln w="9525">
+                <a:solidFill>
+                  <a:schemeClr val="bg1"/>
+                </a:solidFill>
+                <a:prstDash val="solid"/>
+              </a:ln>
+              <a:solidFill>
+                <a:schemeClr val="accent5"/>
+              </a:solidFill>
+              <a:effectLst>
+                <a:outerShdw blurRad="12700" dist="38100" dir="2700000" algn="tl" rotWithShape="0">
+                  <a:schemeClr val="accent5">
+                    <a:lumMod val="60000"/>
+                    <a:lumOff val="40000"/>
+                  </a:schemeClr>
+                </a:outerShdw>
+              </a:effectLst>
+            </a:endParaRPr>
+          </a:p>
+        </p:txBody>
+      </p:sp>
+      <p:sp>
+        <p:nvSpPr>
+          <p:cNvPr id="22" name="Esquina doblada 21"/>
+          <p:cNvSpPr/>
+          <p:nvPr/>
+        </p:nvSpPr>
+        <p:spPr>
+          <a:xfrm flipH="1">
+            <a:off x="10376452" y="1060174"/>
+            <a:ext cx="1497494" cy="397564"/>
+          </a:xfrm>
+          <a:prstGeom prst="foldedCorner">
+            <a:avLst/>
+          </a:prstGeom>
+        </p:spPr>
+        <p:style>
+          <a:lnRef idx="2">
+            <a:schemeClr val="accent5"/>
+          </a:lnRef>
+          <a:fillRef idx="1">
+            <a:schemeClr val="lt1"/>
+          </a:fillRef>
+          <a:effectRef idx="0">
+            <a:schemeClr val="accent5"/>
+          </a:effectRef>
+          <a:fontRef idx="minor">
+            <a:schemeClr val="dk1"/>
+          </a:fontRef>
+        </p:style>
+        <p:txBody>
+          <a:bodyPr rtlCol="0" anchor="ctr"/>
+          <a:lstStyle/>
+          <a:p>
+            <a:pPr algn="ctr"/>
+            <a:r>
+              <a:rPr lang="es-GT" dirty="0">
+                <a:solidFill>
+                  <a:schemeClr val="accent1">
+                    <a:lumMod val="75000"/>
+                  </a:schemeClr>
+                </a:solidFill>
+              </a:rPr>
+              <a:t>Cerrar Sesión</a:t>
+            </a:r>
+          </a:p>
+        </p:txBody>
+      </p:sp>
+      <p:sp>
+        <p:nvSpPr>
+          <p:cNvPr id="23" name="Esquina doblada 22"/>
+          <p:cNvSpPr/>
+          <p:nvPr/>
+        </p:nvSpPr>
+        <p:spPr>
+          <a:xfrm>
+            <a:off x="225283" y="1060174"/>
+            <a:ext cx="1497495" cy="397564"/>
+          </a:xfrm>
+          <a:prstGeom prst="foldedCorner">
+            <a:avLst/>
+          </a:prstGeom>
+        </p:spPr>
+        <p:style>
+          <a:lnRef idx="2">
+            <a:schemeClr val="accent5"/>
+          </a:lnRef>
+          <a:fillRef idx="1">
+            <a:schemeClr val="lt1"/>
+          </a:fillRef>
+          <a:effectRef idx="0">
+            <a:schemeClr val="accent5"/>
+          </a:effectRef>
+          <a:fontRef idx="minor">
+            <a:schemeClr val="dk1"/>
+          </a:fontRef>
+        </p:style>
+        <p:txBody>
+          <a:bodyPr rtlCol="0" anchor="ctr"/>
+          <a:lstStyle/>
+          <a:p>
+            <a:pPr algn="ctr"/>
+            <a:r>
+              <a:rPr lang="es-GT" sz="1400" dirty="0">
+                <a:solidFill>
+                  <a:schemeClr val="accent1">
+                    <a:lumMod val="75000"/>
+                  </a:schemeClr>
+                </a:solidFill>
+              </a:rPr>
+              <a:t>“Usuario Activo”</a:t>
+            </a:r>
+          </a:p>
+        </p:txBody>
+      </p:sp>
+    </p:spTree>
+    <p:extLst>
+      <p:ext uri="{BB962C8B-B14F-4D97-AF65-F5344CB8AC3E}">
+        <p14:creationId xmlns:p14="http://schemas.microsoft.com/office/powerpoint/2010/main" val="57379434"/>
+      </p:ext>
+    </p:extLst>
+  </p:cSld>
+  <p:clrMapOvr>
+    <a:masterClrMapping/>
+  </p:clrMapOvr>
+</p:sld>
+</file>
+
+<file path=ppt/slides/slide5.xml><?xml version="1.0" encoding="utf-8"?>
+<p:sld xmlns:a="http://schemas.openxmlformats.org/drawingml/2006/main" xmlns:r="http://schemas.openxmlformats.org/officeDocument/2006/relationships" xmlns:p="http://schemas.openxmlformats.org/presentationml/2006/main">
+  <p:cSld>
+    <p:spTree>
+      <p:nvGrpSpPr>
+        <p:cNvPr id="1" name=""/>
+        <p:cNvGrpSpPr/>
+        <p:nvPr/>
+      </p:nvGrpSpPr>
+      <p:grpSpPr>
+        <a:xfrm>
+          <a:off x="0" y="0"/>
+          <a:ext cx="0" cy="0"/>
+          <a:chOff x="0" y="0"/>
+          <a:chExt cx="0" cy="0"/>
+        </a:xfrm>
+      </p:grpSpPr>
+      <p:sp>
+        <p:nvSpPr>
+          <p:cNvPr id="2" name="Rectángulo 1"/>
+          <p:cNvSpPr/>
+          <p:nvPr/>
+        </p:nvSpPr>
+        <p:spPr>
+          <a:xfrm>
+            <a:off x="225287" y="1060174"/>
+            <a:ext cx="11648661" cy="5340626"/>
+          </a:xfrm>
+          <a:prstGeom prst="rect">
+            <a:avLst/>
+          </a:prstGeom>
+          <a:gradFill flip="none" rotWithShape="1">
+            <a:gsLst>
+              <a:gs pos="0">
+                <a:schemeClr val="accent1">
+                  <a:tint val="66000"/>
+                  <a:satMod val="160000"/>
+                </a:schemeClr>
+              </a:gs>
+              <a:gs pos="50000">
+                <a:schemeClr val="accent1">
+                  <a:tint val="44500"/>
+                  <a:satMod val="160000"/>
+                </a:schemeClr>
+              </a:gs>
+              <a:gs pos="100000">
+                <a:schemeClr val="accent1">
+                  <a:tint val="23500"/>
+                  <a:satMod val="160000"/>
+                </a:schemeClr>
+              </a:gs>
+            </a:gsLst>
+            <a:path path="circle">
+              <a:fillToRect l="50000" t="50000" r="50000" b="50000"/>
+            </a:path>
+            <a:tileRect/>
+          </a:gradFill>
+          <a:ln w="9525" cap="flat" cmpd="sng" algn="ctr">
+            <a:solidFill>
+              <a:schemeClr val="dk1"/>
+            </a:solidFill>
+            <a:prstDash val="solid"/>
+            <a:round/>
+            <a:headEnd type="none" w="med" len="med"/>
+            <a:tailEnd type="none" w="med" len="med"/>
+          </a:ln>
+        </p:spPr>
+        <p:style>
+          <a:lnRef idx="0">
+            <a:scrgbClr r="0" g="0" b="0"/>
+          </a:lnRef>
+          <a:fillRef idx="0">
+            <a:scrgbClr r="0" g="0" b="0"/>
+          </a:fillRef>
+          <a:effectRef idx="0">
+            <a:scrgbClr r="0" g="0" b="0"/>
+          </a:effectRef>
+          <a:fontRef idx="minor">
+            <a:schemeClr val="dk1"/>
+          </a:fontRef>
+        </p:style>
+        <p:txBody>
+          <a:bodyPr rtlCol="0" anchor="ctr"/>
+          <a:lstStyle/>
+          <a:p>
+            <a:pPr algn="ctr"/>
+            <a:endParaRPr lang="es-GT"/>
+          </a:p>
+        </p:txBody>
+      </p:sp>
+      <p:pic>
+        <p:nvPicPr>
+          <p:cNvPr id="3" name="Imagen 2"/>
+          <p:cNvPicPr>
+            <a:picLocks noChangeAspect="1"/>
+          </p:cNvPicPr>
+          <p:nvPr/>
+        </p:nvPicPr>
+        <p:blipFill rotWithShape="1">
+          <a:blip r:embed="rId2">
+            <a:extLst>
+              <a:ext uri="{28A0092B-C50C-407E-A947-70E740481C1C}">
+                <a14:useLocalDpi xmlns:a14="http://schemas.microsoft.com/office/drawing/2010/main" val="0"/>
+              </a:ext>
+            </a:extLst>
+          </a:blip>
+          <a:srcRect l="22709" b="14423"/>
+          <a:stretch/>
+        </p:blipFill>
+        <p:spPr>
+          <a:xfrm>
+            <a:off x="225287" y="2783964"/>
+            <a:ext cx="4300396" cy="3616836"/>
+          </a:xfrm>
+          <a:prstGeom prst="rect">
+            <a:avLst/>
+          </a:prstGeom>
+        </p:spPr>
+      </p:pic>
+      <p:sp>
+        <p:nvSpPr>
+          <p:cNvPr id="4" name="Rectángulo 3"/>
+          <p:cNvSpPr/>
+          <p:nvPr/>
+        </p:nvSpPr>
+        <p:spPr>
+          <a:xfrm>
+            <a:off x="6864626" y="3087756"/>
+            <a:ext cx="2213113" cy="450574"/>
+          </a:xfrm>
+          <a:prstGeom prst="rect">
+            <a:avLst/>
+          </a:prstGeom>
+        </p:spPr>
+        <p:style>
+          <a:lnRef idx="2">
+            <a:schemeClr val="accent1"/>
+          </a:lnRef>
+          <a:fillRef idx="1">
+            <a:schemeClr val="lt1"/>
+          </a:fillRef>
+          <a:effectRef idx="0">
+            <a:schemeClr val="accent1"/>
+          </a:effectRef>
+          <a:fontRef idx="minor">
+            <a:schemeClr val="dk1"/>
+          </a:fontRef>
+        </p:style>
+        <p:txBody>
+          <a:bodyPr rtlCol="0" anchor="ctr"/>
+          <a:lstStyle/>
+          <a:p>
+            <a:r>
+              <a:rPr lang="es-GT" dirty="0">
+                <a:solidFill>
+                  <a:schemeClr val="bg1">
+                    <a:lumMod val="65000"/>
+                  </a:schemeClr>
+                </a:solidFill>
+              </a:rPr>
+              <a:t>Usuario</a:t>
+            </a:r>
+          </a:p>
+        </p:txBody>
+      </p:sp>
+      <p:sp>
+        <p:nvSpPr>
+          <p:cNvPr id="5" name="Rectángulo 4"/>
+          <p:cNvSpPr/>
+          <p:nvPr/>
+        </p:nvSpPr>
+        <p:spPr>
+          <a:xfrm>
+            <a:off x="6864626" y="3738120"/>
+            <a:ext cx="2213113" cy="450574"/>
+          </a:xfrm>
+          <a:prstGeom prst="rect">
+            <a:avLst/>
+          </a:prstGeom>
+        </p:spPr>
+        <p:style>
+          <a:lnRef idx="2">
+            <a:schemeClr val="accent1"/>
+          </a:lnRef>
+          <a:fillRef idx="1">
+            <a:schemeClr val="lt1"/>
+          </a:fillRef>
+          <a:effectRef idx="0">
+            <a:schemeClr val="accent1"/>
+          </a:effectRef>
+          <a:fontRef idx="minor">
+            <a:schemeClr val="dk1"/>
+          </a:fontRef>
+        </p:style>
+        <p:txBody>
+          <a:bodyPr rtlCol="0" anchor="ctr"/>
+          <a:lstStyle/>
+          <a:p>
+            <a:r>
+              <a:rPr lang="es-GT" dirty="0">
+                <a:solidFill>
+                  <a:schemeClr val="bg1">
+                    <a:lumMod val="65000"/>
+                  </a:schemeClr>
+                </a:solidFill>
+              </a:rPr>
+              <a:t>Contraseña</a:t>
+            </a:r>
+          </a:p>
+        </p:txBody>
+      </p:sp>
+      <p:sp>
+        <p:nvSpPr>
+          <p:cNvPr id="6" name="Rectángulo redondeado 5"/>
+          <p:cNvSpPr/>
+          <p:nvPr/>
+        </p:nvSpPr>
+        <p:spPr>
+          <a:xfrm>
+            <a:off x="8216348" y="4388484"/>
+            <a:ext cx="861391" cy="357809"/>
+          </a:xfrm>
+          <a:prstGeom prst="roundRect">
+            <a:avLst/>
+          </a:prstGeom>
+        </p:spPr>
+        <p:style>
+          <a:lnRef idx="0">
+            <a:schemeClr val="accent1"/>
+          </a:lnRef>
+          <a:fillRef idx="3">
+            <a:schemeClr val="accent1"/>
+          </a:fillRef>
+          <a:effectRef idx="3">
+            <a:schemeClr val="accent1"/>
+          </a:effectRef>
+          <a:fontRef idx="minor">
+            <a:schemeClr val="lt1"/>
+          </a:fontRef>
+        </p:style>
+        <p:txBody>
+          <a:bodyPr rtlCol="0" anchor="ctr"/>
+          <a:lstStyle/>
+          <a:p>
+            <a:pPr algn="ctr"/>
+            <a:r>
+              <a:rPr lang="es-GT" dirty="0"/>
+              <a:t>Iniciar</a:t>
+            </a:r>
+          </a:p>
+        </p:txBody>
+      </p:sp>
+      <p:sp>
+        <p:nvSpPr>
+          <p:cNvPr id="7" name="Rectángulo 6"/>
+          <p:cNvSpPr/>
+          <p:nvPr/>
+        </p:nvSpPr>
+        <p:spPr>
+          <a:xfrm>
+            <a:off x="1057897" y="1129457"/>
+            <a:ext cx="9983439" cy="1323439"/>
+          </a:xfrm>
+          <a:prstGeom prst="rect">
+            <a:avLst/>
+          </a:prstGeom>
+          <a:noFill/>
+        </p:spPr>
+        <p:txBody>
+          <a:bodyPr wrap="none" lIns="91440" tIns="45720" rIns="91440" bIns="45720">
+            <a:spAutoFit/>
+          </a:bodyPr>
+          <a:lstStyle/>
+          <a:p>
+            <a:pPr algn="ctr"/>
+            <a:r>
+              <a:rPr lang="es-ES" sz="4000" b="1" cap="none" spc="0" dirty="0">
+                <a:ln w="9525">
+                  <a:solidFill>
+                    <a:schemeClr val="bg1"/>
+                  </a:solidFill>
+                  <a:prstDash val="solid"/>
+                </a:ln>
+                <a:solidFill>
+                  <a:schemeClr val="accent5"/>
+                </a:solidFill>
+                <a:effectLst>
+                  <a:outerShdw blurRad="12700" dist="38100" dir="2700000" algn="tl" rotWithShape="0">
+                    <a:schemeClr val="accent5">
+                      <a:lumMod val="60000"/>
+                      <a:lumOff val="40000"/>
+                    </a:schemeClr>
+                  </a:outerShdw>
+                </a:effectLst>
+              </a:rPr>
+              <a:t>Sistema de Gestión de Información Estudiantil</a:t>
+            </a:r>
+          </a:p>
+          <a:p>
+            <a:pPr algn="ctr"/>
+            <a:r>
+              <a:rPr lang="es-ES" sz="4000" b="1" dirty="0">
+                <a:ln w="9525">
+                  <a:solidFill>
+                    <a:schemeClr val="bg1"/>
+                  </a:solidFill>
+                  <a:prstDash val="solid"/>
+                </a:ln>
+                <a:solidFill>
+                  <a:schemeClr val="accent5"/>
+                </a:solidFill>
+                <a:effectLst>
+                  <a:outerShdw blurRad="12700" dist="38100" dir="2700000" algn="tl" rotWithShape="0">
+                    <a:schemeClr val="accent5">
+                      <a:lumMod val="60000"/>
+                      <a:lumOff val="40000"/>
+                    </a:schemeClr>
+                  </a:outerShdw>
+                </a:effectLst>
+              </a:rPr>
+              <a:t>SIGIE</a:t>
+            </a:r>
+            <a:endParaRPr lang="es-ES" sz="4000" b="1" cap="none" spc="0" dirty="0">
+              <a:ln w="9525">
+                <a:solidFill>
+                  <a:schemeClr val="bg1"/>
+                </a:solidFill>
+                <a:prstDash val="solid"/>
+              </a:ln>
+              <a:solidFill>
+                <a:schemeClr val="accent5"/>
+              </a:solidFill>
+              <a:effectLst>
+                <a:outerShdw blurRad="12700" dist="38100" dir="2700000" algn="tl" rotWithShape="0">
+                  <a:schemeClr val="accent5">
+                    <a:lumMod val="60000"/>
+                    <a:lumOff val="40000"/>
+                  </a:schemeClr>
+                </a:outerShdw>
+              </a:effectLst>
+            </a:endParaRPr>
+          </a:p>
+        </p:txBody>
+      </p:sp>
+      <p:sp>
+        <p:nvSpPr>
+          <p:cNvPr id="8" name="CuadroTexto 7"/>
+          <p:cNvSpPr txBox="1"/>
+          <p:nvPr/>
+        </p:nvSpPr>
+        <p:spPr>
+          <a:xfrm>
+            <a:off x="1351722" y="357809"/>
+            <a:ext cx="2748894" cy="369332"/>
+          </a:xfrm>
+          <a:prstGeom prst="rect">
+            <a:avLst/>
+          </a:prstGeom>
+          <a:noFill/>
+        </p:spPr>
+        <p:txBody>
+          <a:bodyPr wrap="none" rtlCol="0">
+            <a:spAutoFit/>
+          </a:bodyPr>
+          <a:lstStyle/>
+          <a:p>
+            <a:r>
+              <a:rPr lang="es-GT" dirty="0"/>
+              <a:t>Información de estudiantes</a:t>
+            </a:r>
+          </a:p>
+        </p:txBody>
+      </p:sp>
+    </p:spTree>
+    <p:extLst>
+      <p:ext uri="{BB962C8B-B14F-4D97-AF65-F5344CB8AC3E}">
+        <p14:creationId xmlns:p14="http://schemas.microsoft.com/office/powerpoint/2010/main" val="1493746140"/>
+      </p:ext>
+    </p:extLst>
+  </p:cSld>
+  <p:clrMapOvr>
+    <a:masterClrMapping/>
+  </p:clrMapOvr>
+</p:sld>
+</file>
+
 <file path=ppt/theme/theme1.xml><?xml version="1.0" encoding="utf-8"?>
 <a:theme xmlns:a="http://schemas.openxmlformats.org/drawingml/2006/main" name="Tema de Office">
   <a:themeElements>

</xml_diff>